<commit_message>
added the CSS file for the memory game
empty
</commit_message>
<xml_diff>
--- a/Multimodales Memory.pptx
+++ b/Multimodales Memory.pptx
@@ -8,6 +8,7 @@
     <p:sldId id="256" r:id="rId2"/>
     <p:sldId id="257" r:id="rId3"/>
     <p:sldId id="258" r:id="rId4"/>
+    <p:sldId id="259" r:id="rId5"/>
   </p:sldIdLst>
   <p:sldSz cx="12192000" cy="6858000"/>
   <p:notesSz cx="6858000" cy="9144000"/>
@@ -6613,6 +6614,729 @@
 </p:sld>
 </file>
 
+<file path=ppt/slides/slide4.xml><?xml version="1.0" encoding="utf-8"?>
+<p:sld xmlns:a="http://schemas.openxmlformats.org/drawingml/2006/main" xmlns:r="http://schemas.openxmlformats.org/officeDocument/2006/relationships" xmlns:p="http://schemas.openxmlformats.org/presentationml/2006/main">
+  <p:cSld>
+    <p:bg>
+      <p:bgPr>
+        <a:solidFill>
+          <a:schemeClr val="tx1"/>
+        </a:solidFill>
+        <a:effectLst/>
+      </p:bgPr>
+    </p:bg>
+    <p:spTree>
+      <p:nvGrpSpPr>
+        <p:cNvPr id="1" name=""/>
+        <p:cNvGrpSpPr/>
+        <p:nvPr/>
+      </p:nvGrpSpPr>
+      <p:grpSpPr>
+        <a:xfrm>
+          <a:off x="0" y="0"/>
+          <a:ext cx="0" cy="0"/>
+          <a:chOff x="0" y="0"/>
+          <a:chExt cx="0" cy="0"/>
+        </a:xfrm>
+      </p:grpSpPr>
+      <p:sp>
+        <p:nvSpPr>
+          <p:cNvPr id="2" name="Titel 1">
+            <a:extLst>
+              <a:ext uri="{FF2B5EF4-FFF2-40B4-BE49-F238E27FC236}">
+                <a16:creationId xmlns:a16="http://schemas.microsoft.com/office/drawing/2014/main" id="{F70BA3B4-D8CC-C0D6-8BE2-D919D78ED710}"/>
+              </a:ext>
+            </a:extLst>
+          </p:cNvPr>
+          <p:cNvSpPr txBox="1">
+            <a:spLocks/>
+          </p:cNvSpPr>
+          <p:nvPr/>
+        </p:nvSpPr>
+        <p:spPr>
+          <a:xfrm>
+            <a:off x="4748380" y="2444968"/>
+            <a:ext cx="3242440" cy="1385599"/>
+          </a:xfrm>
+          <a:prstGeom prst="rect">
+            <a:avLst/>
+          </a:prstGeom>
+        </p:spPr>
+        <p:txBody>
+          <a:bodyPr anchor="ctr">
+            <a:normAutofit fontScale="97500"/>
+          </a:bodyPr>
+          <a:lstStyle>
+            <a:lvl1pPr algn="l" defTabSz="914400" rtl="0" eaLnBrk="1" latinLnBrk="0" hangingPunct="1">
+              <a:lnSpc>
+                <a:spcPct val="90000"/>
+              </a:lnSpc>
+              <a:spcBef>
+                <a:spcPct val="0"/>
+              </a:spcBef>
+              <a:buNone/>
+              <a:defRPr sz="4400" kern="1200">
+                <a:solidFill>
+                  <a:schemeClr val="tx1"/>
+                </a:solidFill>
+                <a:latin typeface="+mj-lt"/>
+                <a:ea typeface="+mj-ea"/>
+                <a:cs typeface="+mj-cs"/>
+              </a:defRPr>
+            </a:lvl1pPr>
+          </a:lstStyle>
+          <a:p>
+            <a:pPr algn="ctr"/>
+            <a:r>
+              <a:rPr lang="de-DE" cap="small" dirty="0">
+                <a:solidFill>
+                  <a:schemeClr val="bg1"/>
+                </a:solidFill>
+                <a:latin typeface="Gill Sans MT Condensed" panose="020B0506020104020203" pitchFamily="34" charset="0"/>
+              </a:rPr>
+              <a:t>techn. Funktionen</a:t>
+            </a:r>
+          </a:p>
+        </p:txBody>
+      </p:sp>
+      <p:sp>
+        <p:nvSpPr>
+          <p:cNvPr id="3" name="Rechteck 2">
+            <a:extLst>
+              <a:ext uri="{FF2B5EF4-FFF2-40B4-BE49-F238E27FC236}">
+                <a16:creationId xmlns:a16="http://schemas.microsoft.com/office/drawing/2014/main" id="{8E22856E-1572-0284-3E52-42A4475CB718}"/>
+              </a:ext>
+            </a:extLst>
+          </p:cNvPr>
+          <p:cNvSpPr/>
+          <p:nvPr/>
+        </p:nvSpPr>
+        <p:spPr>
+          <a:xfrm rot="5400000">
+            <a:off x="6166209" y="1462238"/>
+            <a:ext cx="406783" cy="4153629"/>
+          </a:xfrm>
+          <a:prstGeom prst="rect">
+            <a:avLst/>
+          </a:prstGeom>
+          <a:solidFill>
+            <a:srgbClr val="00B0F0">
+              <a:alpha val="53000"/>
+            </a:srgbClr>
+          </a:solidFill>
+          <a:ln cap="rnd" cmpd="dbl">
+            <a:noFill/>
+            <a:round/>
+          </a:ln>
+          <a:effectLst/>
+        </p:spPr>
+        <p:style>
+          <a:lnRef idx="2">
+            <a:schemeClr val="accent1">
+              <a:shade val="50000"/>
+            </a:schemeClr>
+          </a:lnRef>
+          <a:fillRef idx="1">
+            <a:schemeClr val="accent1"/>
+          </a:fillRef>
+          <a:effectRef idx="0">
+            <a:schemeClr val="accent1"/>
+          </a:effectRef>
+          <a:fontRef idx="minor">
+            <a:schemeClr val="lt1"/>
+          </a:fontRef>
+        </p:style>
+        <p:txBody>
+          <a:bodyPr rtlCol="0" anchor="ctr"/>
+          <a:lstStyle/>
+          <a:p>
+            <a:pPr algn="ctr"/>
+            <a:endParaRPr lang="de-DE">
+              <a:latin typeface="Gill Sans MT Condensed" panose="020B0506020104020203" pitchFamily="34" charset="0"/>
+            </a:endParaRPr>
+          </a:p>
+        </p:txBody>
+      </p:sp>
+      <p:sp>
+        <p:nvSpPr>
+          <p:cNvPr id="4" name="Rechteck 3">
+            <a:extLst>
+              <a:ext uri="{FF2B5EF4-FFF2-40B4-BE49-F238E27FC236}">
+                <a16:creationId xmlns:a16="http://schemas.microsoft.com/office/drawing/2014/main" id="{6D2F42A9-6E6C-848F-3EEF-6FA13381117A}"/>
+              </a:ext>
+            </a:extLst>
+          </p:cNvPr>
+          <p:cNvSpPr/>
+          <p:nvPr/>
+        </p:nvSpPr>
+        <p:spPr>
+          <a:xfrm rot="5400000">
+            <a:off x="6332000" y="1915356"/>
+            <a:ext cx="75201" cy="2937954"/>
+          </a:xfrm>
+          <a:prstGeom prst="rect">
+            <a:avLst/>
+          </a:prstGeom>
+          <a:solidFill>
+            <a:srgbClr val="00B0F0"/>
+          </a:solidFill>
+          <a:ln cap="rnd" cmpd="dbl">
+            <a:solidFill>
+              <a:schemeClr val="bg1"/>
+            </a:solidFill>
+            <a:round/>
+          </a:ln>
+          <a:effectLst/>
+        </p:spPr>
+        <p:style>
+          <a:lnRef idx="2">
+            <a:schemeClr val="accent1">
+              <a:shade val="50000"/>
+            </a:schemeClr>
+          </a:lnRef>
+          <a:fillRef idx="1">
+            <a:schemeClr val="accent1"/>
+          </a:fillRef>
+          <a:effectRef idx="0">
+            <a:schemeClr val="accent1"/>
+          </a:effectRef>
+          <a:fontRef idx="minor">
+            <a:schemeClr val="lt1"/>
+          </a:fontRef>
+        </p:style>
+        <p:txBody>
+          <a:bodyPr rtlCol="0" anchor="ctr"/>
+          <a:lstStyle/>
+          <a:p>
+            <a:pPr algn="ctr"/>
+            <a:endParaRPr lang="de-DE">
+              <a:latin typeface="Gill Sans MT Condensed" panose="020B0506020104020203" pitchFamily="34" charset="0"/>
+            </a:endParaRPr>
+          </a:p>
+        </p:txBody>
+      </p:sp>
+      <p:sp>
+        <p:nvSpPr>
+          <p:cNvPr id="8" name="Titel 1">
+            <a:extLst>
+              <a:ext uri="{FF2B5EF4-FFF2-40B4-BE49-F238E27FC236}">
+                <a16:creationId xmlns:a16="http://schemas.microsoft.com/office/drawing/2014/main" id="{5DE0B742-3E7D-BBC6-A497-A06737981664}"/>
+              </a:ext>
+            </a:extLst>
+          </p:cNvPr>
+          <p:cNvSpPr txBox="1">
+            <a:spLocks/>
+          </p:cNvSpPr>
+          <p:nvPr/>
+        </p:nvSpPr>
+        <p:spPr>
+          <a:xfrm>
+            <a:off x="4614643" y="5922465"/>
+            <a:ext cx="3509913" cy="1385599"/>
+          </a:xfrm>
+          <a:prstGeom prst="rect">
+            <a:avLst/>
+          </a:prstGeom>
+        </p:spPr>
+        <p:txBody>
+          <a:bodyPr anchor="ctr">
+            <a:normAutofit fontScale="97500"/>
+          </a:bodyPr>
+          <a:lstStyle>
+            <a:lvl1pPr algn="l" defTabSz="914400" rtl="0" eaLnBrk="1" latinLnBrk="0" hangingPunct="1">
+              <a:lnSpc>
+                <a:spcPct val="90000"/>
+              </a:lnSpc>
+              <a:spcBef>
+                <a:spcPct val="0"/>
+              </a:spcBef>
+              <a:buNone/>
+              <a:defRPr sz="4400" kern="1200">
+                <a:solidFill>
+                  <a:schemeClr val="tx1"/>
+                </a:solidFill>
+                <a:latin typeface="+mj-lt"/>
+                <a:ea typeface="+mj-ea"/>
+                <a:cs typeface="+mj-cs"/>
+              </a:defRPr>
+            </a:lvl1pPr>
+          </a:lstStyle>
+          <a:p>
+            <a:pPr algn="ctr"/>
+            <a:r>
+              <a:rPr lang="de-DE" cap="small" dirty="0">
+                <a:solidFill>
+                  <a:schemeClr val="bg1"/>
+                </a:solidFill>
+                <a:latin typeface="Gill Sans MT Condensed" panose="020B0506020104020203" pitchFamily="34" charset="0"/>
+              </a:rPr>
+              <a:t>Multimodales Memory</a:t>
+            </a:r>
+          </a:p>
+        </p:txBody>
+      </p:sp>
+      <p:sp>
+        <p:nvSpPr>
+          <p:cNvPr id="10" name="Textfeld 9">
+            <a:extLst>
+              <a:ext uri="{FF2B5EF4-FFF2-40B4-BE49-F238E27FC236}">
+                <a16:creationId xmlns:a16="http://schemas.microsoft.com/office/drawing/2014/main" id="{9B41F6F2-517B-F6D5-28A7-1750E7AA6A3B}"/>
+              </a:ext>
+            </a:extLst>
+          </p:cNvPr>
+          <p:cNvSpPr txBox="1"/>
+          <p:nvPr/>
+        </p:nvSpPr>
+        <p:spPr>
+          <a:xfrm>
+            <a:off x="662234" y="839011"/>
+            <a:ext cx="2976291" cy="369332"/>
+          </a:xfrm>
+          <a:prstGeom prst="rect">
+            <a:avLst/>
+          </a:prstGeom>
+          <a:noFill/>
+        </p:spPr>
+        <p:txBody>
+          <a:bodyPr wrap="square">
+            <a:spAutoFit/>
+          </a:bodyPr>
+          <a:lstStyle/>
+          <a:p>
+            <a:r>
+              <a:rPr lang="de-DE" dirty="0">
+                <a:solidFill>
+                  <a:schemeClr val="bg1"/>
+                </a:solidFill>
+                <a:latin typeface="Gill Sans MT Condensed" panose="020B0506020104020203" pitchFamily="34" charset="0"/>
+              </a:rPr>
+              <a:t>Medien abspielbar innerhalb der Kästchen </a:t>
+            </a:r>
+          </a:p>
+        </p:txBody>
+      </p:sp>
+      <p:sp>
+        <p:nvSpPr>
+          <p:cNvPr id="12" name="Textfeld 11">
+            <a:extLst>
+              <a:ext uri="{FF2B5EF4-FFF2-40B4-BE49-F238E27FC236}">
+                <a16:creationId xmlns:a16="http://schemas.microsoft.com/office/drawing/2014/main" id="{B20A96E6-C399-4854-7810-FDECAF8F312E}"/>
+              </a:ext>
+            </a:extLst>
+          </p:cNvPr>
+          <p:cNvSpPr txBox="1"/>
+          <p:nvPr/>
+        </p:nvSpPr>
+        <p:spPr>
+          <a:xfrm>
+            <a:off x="662234" y="1780300"/>
+            <a:ext cx="2222368" cy="369332"/>
+          </a:xfrm>
+          <a:prstGeom prst="rect">
+            <a:avLst/>
+          </a:prstGeom>
+          <a:noFill/>
+        </p:spPr>
+        <p:txBody>
+          <a:bodyPr wrap="square">
+            <a:spAutoFit/>
+          </a:bodyPr>
+          <a:lstStyle/>
+          <a:p>
+            <a:r>
+              <a:rPr lang="de-DE" dirty="0">
+                <a:solidFill>
+                  <a:schemeClr val="bg1"/>
+                </a:solidFill>
+                <a:latin typeface="Gill Sans MT Condensed" panose="020B0506020104020203" pitchFamily="34" charset="0"/>
+              </a:rPr>
+              <a:t>Zufälliges Verteilen der Karten </a:t>
+            </a:r>
+          </a:p>
+        </p:txBody>
+      </p:sp>
+      <p:sp>
+        <p:nvSpPr>
+          <p:cNvPr id="14" name="Textfeld 13">
+            <a:extLst>
+              <a:ext uri="{FF2B5EF4-FFF2-40B4-BE49-F238E27FC236}">
+                <a16:creationId xmlns:a16="http://schemas.microsoft.com/office/drawing/2014/main" id="{906624E8-9AC2-A6E9-3E6B-1F2E59E9B0CE}"/>
+              </a:ext>
+            </a:extLst>
+          </p:cNvPr>
+          <p:cNvSpPr txBox="1"/>
+          <p:nvPr/>
+        </p:nvSpPr>
+        <p:spPr>
+          <a:xfrm>
+            <a:off x="662234" y="2839873"/>
+            <a:ext cx="2781335" cy="369332"/>
+          </a:xfrm>
+          <a:prstGeom prst="rect">
+            <a:avLst/>
+          </a:prstGeom>
+          <a:noFill/>
+        </p:spPr>
+        <p:txBody>
+          <a:bodyPr wrap="square">
+            <a:spAutoFit/>
+          </a:bodyPr>
+          <a:lstStyle/>
+          <a:p>
+            <a:r>
+              <a:rPr lang="de-DE" dirty="0">
+                <a:solidFill>
+                  <a:schemeClr val="bg1"/>
+                </a:solidFill>
+                <a:latin typeface="Gill Sans MT Condensed" panose="020B0506020104020203" pitchFamily="34" charset="0"/>
+              </a:rPr>
+              <a:t>Zähler für die Anzahl an Player-Moves</a:t>
+            </a:r>
+          </a:p>
+        </p:txBody>
+      </p:sp>
+      <p:sp>
+        <p:nvSpPr>
+          <p:cNvPr id="16" name="Textfeld 15">
+            <a:extLst>
+              <a:ext uri="{FF2B5EF4-FFF2-40B4-BE49-F238E27FC236}">
+                <a16:creationId xmlns:a16="http://schemas.microsoft.com/office/drawing/2014/main" id="{E52F0777-8587-BAB7-F5ED-8CBA369128D0}"/>
+              </a:ext>
+            </a:extLst>
+          </p:cNvPr>
+          <p:cNvSpPr txBox="1"/>
+          <p:nvPr/>
+        </p:nvSpPr>
+        <p:spPr>
+          <a:xfrm>
+            <a:off x="662234" y="4179140"/>
+            <a:ext cx="1562493" cy="369332"/>
+          </a:xfrm>
+          <a:prstGeom prst="rect">
+            <a:avLst/>
+          </a:prstGeom>
+          <a:noFill/>
+        </p:spPr>
+        <p:txBody>
+          <a:bodyPr wrap="square">
+            <a:spAutoFit/>
+          </a:bodyPr>
+          <a:lstStyle/>
+          <a:p>
+            <a:r>
+              <a:rPr lang="de-DE" dirty="0">
+                <a:solidFill>
+                  <a:schemeClr val="bg1"/>
+                </a:solidFill>
+                <a:latin typeface="Gill Sans MT Condensed" panose="020B0506020104020203" pitchFamily="34" charset="0"/>
+              </a:rPr>
+              <a:t>"Neustart" Funktion </a:t>
+            </a:r>
+          </a:p>
+        </p:txBody>
+      </p:sp>
+      <p:sp>
+        <p:nvSpPr>
+          <p:cNvPr id="18" name="Textfeld 17">
+            <a:extLst>
+              <a:ext uri="{FF2B5EF4-FFF2-40B4-BE49-F238E27FC236}">
+                <a16:creationId xmlns:a16="http://schemas.microsoft.com/office/drawing/2014/main" id="{D83289A4-AECD-EAB8-1080-3CE6F9721286}"/>
+              </a:ext>
+            </a:extLst>
+          </p:cNvPr>
+          <p:cNvSpPr txBox="1"/>
+          <p:nvPr/>
+        </p:nvSpPr>
+        <p:spPr>
+          <a:xfrm>
+            <a:off x="4964391" y="833467"/>
+            <a:ext cx="610163" cy="369332"/>
+          </a:xfrm>
+          <a:prstGeom prst="rect">
+            <a:avLst/>
+          </a:prstGeom>
+          <a:noFill/>
+        </p:spPr>
+        <p:txBody>
+          <a:bodyPr wrap="square">
+            <a:spAutoFit/>
+          </a:bodyPr>
+          <a:lstStyle/>
+          <a:p>
+            <a:r>
+              <a:rPr lang="de-DE" dirty="0" err="1">
+                <a:solidFill>
+                  <a:schemeClr val="bg1"/>
+                </a:solidFill>
+                <a:latin typeface="Gill Sans MT Condensed" panose="020B0506020104020203" pitchFamily="34" charset="0"/>
+              </a:rPr>
+              <a:t>Timer</a:t>
+            </a:r>
+            <a:r>
+              <a:rPr lang="de-DE" dirty="0">
+                <a:solidFill>
+                  <a:schemeClr val="bg1"/>
+                </a:solidFill>
+                <a:latin typeface="Gill Sans MT Condensed" panose="020B0506020104020203" pitchFamily="34" charset="0"/>
+              </a:rPr>
+              <a:t> </a:t>
+            </a:r>
+          </a:p>
+        </p:txBody>
+      </p:sp>
+      <p:sp>
+        <p:nvSpPr>
+          <p:cNvPr id="20" name="Textfeld 19">
+            <a:extLst>
+              <a:ext uri="{FF2B5EF4-FFF2-40B4-BE49-F238E27FC236}">
+                <a16:creationId xmlns:a16="http://schemas.microsoft.com/office/drawing/2014/main" id="{CB2331F2-753E-6A57-3D64-6648A0693AD1}"/>
+              </a:ext>
+            </a:extLst>
+          </p:cNvPr>
+          <p:cNvSpPr txBox="1"/>
+          <p:nvPr/>
+        </p:nvSpPr>
+        <p:spPr>
+          <a:xfrm>
+            <a:off x="7955010" y="1759367"/>
+            <a:ext cx="3545792" cy="369332"/>
+          </a:xfrm>
+          <a:prstGeom prst="rect">
+            <a:avLst/>
+          </a:prstGeom>
+          <a:noFill/>
+        </p:spPr>
+        <p:txBody>
+          <a:bodyPr wrap="square">
+            <a:spAutoFit/>
+          </a:bodyPr>
+          <a:lstStyle/>
+          <a:p>
+            <a:r>
+              <a:rPr lang="de-DE" dirty="0">
+                <a:solidFill>
+                  <a:schemeClr val="bg1"/>
+                </a:solidFill>
+                <a:latin typeface="Gill Sans MT Condensed" panose="020B0506020104020203" pitchFamily="34" charset="0"/>
+              </a:rPr>
+              <a:t>Pop-Up mit den Regeln des Spiels bzw. Erklärung </a:t>
+            </a:r>
+          </a:p>
+        </p:txBody>
+      </p:sp>
+      <p:sp>
+        <p:nvSpPr>
+          <p:cNvPr id="22" name="Textfeld 21">
+            <a:extLst>
+              <a:ext uri="{FF2B5EF4-FFF2-40B4-BE49-F238E27FC236}">
+                <a16:creationId xmlns:a16="http://schemas.microsoft.com/office/drawing/2014/main" id="{7F69884E-43D2-0862-F7CC-36F08D0B0A49}"/>
+              </a:ext>
+            </a:extLst>
+          </p:cNvPr>
+          <p:cNvSpPr txBox="1"/>
+          <p:nvPr/>
+        </p:nvSpPr>
+        <p:spPr>
+          <a:xfrm>
+            <a:off x="615099" y="5098633"/>
+            <a:ext cx="2782222" cy="369332"/>
+          </a:xfrm>
+          <a:prstGeom prst="rect">
+            <a:avLst/>
+          </a:prstGeom>
+          <a:noFill/>
+        </p:spPr>
+        <p:txBody>
+          <a:bodyPr wrap="square">
+            <a:spAutoFit/>
+          </a:bodyPr>
+          <a:lstStyle/>
+          <a:p>
+            <a:r>
+              <a:rPr lang="de-DE" dirty="0">
+                <a:solidFill>
+                  <a:schemeClr val="bg1"/>
+                </a:solidFill>
+                <a:latin typeface="Gill Sans MT Condensed" panose="020B0506020104020203" pitchFamily="34" charset="0"/>
+              </a:rPr>
+              <a:t>Felder Klassen-orientiert schreiben </a:t>
+            </a:r>
+          </a:p>
+        </p:txBody>
+      </p:sp>
+      <p:sp>
+        <p:nvSpPr>
+          <p:cNvPr id="24" name="Textfeld 23">
+            <a:extLst>
+              <a:ext uri="{FF2B5EF4-FFF2-40B4-BE49-F238E27FC236}">
+                <a16:creationId xmlns:a16="http://schemas.microsoft.com/office/drawing/2014/main" id="{689A4E77-CFEF-CBE7-C32C-DC2BCE70E322}"/>
+              </a:ext>
+            </a:extLst>
+          </p:cNvPr>
+          <p:cNvSpPr txBox="1"/>
+          <p:nvPr/>
+        </p:nvSpPr>
+        <p:spPr>
+          <a:xfrm>
+            <a:off x="8973790" y="5087938"/>
+            <a:ext cx="2697567" cy="369332"/>
+          </a:xfrm>
+          <a:prstGeom prst="rect">
+            <a:avLst/>
+          </a:prstGeom>
+          <a:noFill/>
+        </p:spPr>
+        <p:txBody>
+          <a:bodyPr wrap="square">
+            <a:spAutoFit/>
+          </a:bodyPr>
+          <a:lstStyle/>
+          <a:p>
+            <a:r>
+              <a:rPr lang="de-DE" dirty="0">
+                <a:solidFill>
+                  <a:schemeClr val="bg1"/>
+                </a:solidFill>
+                <a:latin typeface="Gill Sans MT Condensed" panose="020B0506020104020203" pitchFamily="34" charset="0"/>
+              </a:rPr>
+              <a:t>Animation zum "Flippen" der Karten</a:t>
+            </a:r>
+          </a:p>
+        </p:txBody>
+      </p:sp>
+      <p:sp>
+        <p:nvSpPr>
+          <p:cNvPr id="26" name="Textfeld 25">
+            <a:extLst>
+              <a:ext uri="{FF2B5EF4-FFF2-40B4-BE49-F238E27FC236}">
+                <a16:creationId xmlns:a16="http://schemas.microsoft.com/office/drawing/2014/main" id="{03AC2D11-8B81-DFF0-EECB-A4A955490977}"/>
+              </a:ext>
+            </a:extLst>
+          </p:cNvPr>
+          <p:cNvSpPr txBox="1"/>
+          <p:nvPr/>
+        </p:nvSpPr>
+        <p:spPr>
+          <a:xfrm>
+            <a:off x="4964391" y="5098633"/>
+            <a:ext cx="2062113" cy="369332"/>
+          </a:xfrm>
+          <a:prstGeom prst="rect">
+            <a:avLst/>
+          </a:prstGeom>
+          <a:noFill/>
+        </p:spPr>
+        <p:txBody>
+          <a:bodyPr wrap="square">
+            <a:spAutoFit/>
+          </a:bodyPr>
+          <a:lstStyle/>
+          <a:p>
+            <a:r>
+              <a:rPr lang="de-DE" dirty="0">
+                <a:solidFill>
+                  <a:schemeClr val="bg1"/>
+                </a:solidFill>
+                <a:latin typeface="Gill Sans MT Condensed" panose="020B0506020104020203" pitchFamily="34" charset="0"/>
+              </a:rPr>
+              <a:t>„Verschwinden" der Karten </a:t>
+            </a:r>
+          </a:p>
+        </p:txBody>
+      </p:sp>
+      <p:sp>
+        <p:nvSpPr>
+          <p:cNvPr id="28" name="Textfeld 27">
+            <a:extLst>
+              <a:ext uri="{FF2B5EF4-FFF2-40B4-BE49-F238E27FC236}">
+                <a16:creationId xmlns:a16="http://schemas.microsoft.com/office/drawing/2014/main" id="{DC0E6180-076D-B648-6948-DC99DE08DB6A}"/>
+              </a:ext>
+            </a:extLst>
+          </p:cNvPr>
+          <p:cNvSpPr txBox="1"/>
+          <p:nvPr/>
+        </p:nvSpPr>
+        <p:spPr>
+          <a:xfrm>
+            <a:off x="9325567" y="3354705"/>
+            <a:ext cx="2175235" cy="369332"/>
+          </a:xfrm>
+          <a:prstGeom prst="rect">
+            <a:avLst/>
+          </a:prstGeom>
+          <a:noFill/>
+        </p:spPr>
+        <p:txBody>
+          <a:bodyPr wrap="square">
+            <a:spAutoFit/>
+          </a:bodyPr>
+          <a:lstStyle/>
+          <a:p>
+            <a:r>
+              <a:rPr lang="de-DE" dirty="0">
+                <a:solidFill>
+                  <a:schemeClr val="bg1"/>
+                </a:solidFill>
+                <a:latin typeface="Gill Sans MT Condensed" panose="020B0506020104020203" pitchFamily="34" charset="0"/>
+              </a:rPr>
+              <a:t>Validieren der offenen Karten </a:t>
+            </a:r>
+          </a:p>
+        </p:txBody>
+      </p:sp>
+      <p:sp>
+        <p:nvSpPr>
+          <p:cNvPr id="30" name="Textfeld 29">
+            <a:extLst>
+              <a:ext uri="{FF2B5EF4-FFF2-40B4-BE49-F238E27FC236}">
+                <a16:creationId xmlns:a16="http://schemas.microsoft.com/office/drawing/2014/main" id="{1EC74DBF-B7D4-A377-CDA7-111239B61CD8}"/>
+              </a:ext>
+            </a:extLst>
+          </p:cNvPr>
+          <p:cNvSpPr txBox="1"/>
+          <p:nvPr/>
+        </p:nvSpPr>
+        <p:spPr>
+          <a:xfrm>
+            <a:off x="6772884" y="786308"/>
+            <a:ext cx="4727918" cy="369332"/>
+          </a:xfrm>
+          <a:prstGeom prst="rect">
+            <a:avLst/>
+          </a:prstGeom>
+          <a:noFill/>
+        </p:spPr>
+        <p:txBody>
+          <a:bodyPr wrap="square">
+            <a:spAutoFit/>
+          </a:bodyPr>
+          <a:lstStyle/>
+          <a:p>
+            <a:r>
+              <a:rPr lang="de-DE" dirty="0">
+                <a:solidFill>
+                  <a:schemeClr val="bg1"/>
+                </a:solidFill>
+                <a:latin typeface="Gill Sans MT Condensed" panose="020B0506020104020203" pitchFamily="34" charset="0"/>
+              </a:rPr>
+              <a:t>Hilfe Knopf, der ein Pop-up öffnet, dass die Regeln nochmal erklärt </a:t>
+            </a:r>
+          </a:p>
+        </p:txBody>
+      </p:sp>
+    </p:spTree>
+    <p:extLst>
+      <p:ext uri="{BB962C8B-B14F-4D97-AF65-F5344CB8AC3E}">
+        <p14:creationId xmlns:p14="http://schemas.microsoft.com/office/powerpoint/2010/main" val="3681421160"/>
+      </p:ext>
+    </p:extLst>
+  </p:cSld>
+  <p:clrMapOvr>
+    <a:masterClrMapping/>
+  </p:clrMapOvr>
+</p:sld>
+</file>
+
 <file path=ppt/theme/theme1.xml><?xml version="1.0" encoding="utf-8"?>
 <a:theme xmlns:a="http://schemas.openxmlformats.org/drawingml/2006/main" name="Office">
   <a:themeElements>

</xml_diff>